<commit_message>
pptx lesson plans morning
</commit_message>
<xml_diff>
--- a/old/python2_1_3.pptx
+++ b/old/python2_1_3.pptx
@@ -2080,7 +2080,7 @@
             </a:r>
             <a:r>
               <a:rPr b="0"/>
-              <a:t>HDW effectively use while loops to automate computational processes?/ KAHOOT</a:t>
+              <a:t>HDW effectively use while loops to automate computational processes?</a:t>
             </a:r>
           </a:p>
         </p:txBody>
@@ -2128,7 +2128,7 @@
           <a:p>
             <a:pPr/>
             <a:r>
-              <a:t>Dr. O’Brien, 2/4/22</a:t>
+              <a:t>Dr. O’Brien, 2/7/22</a:t>
             </a:r>
           </a:p>
         </p:txBody>
@@ -6182,7 +6182,7 @@
               </a:defRPr>
             </a:pPr>
             <a:r>
-              <a:t>Lesson 1.3</a:t>
+              <a:t>Lesson 2.1</a:t>
             </a:r>
           </a:p>
         </p:txBody>
@@ -6237,7 +6237,7 @@
               <a:defRPr sz="1600"/>
             </a:pPr>
             <a:r>
-              <a:t>4 February 2022</a:t>
+              <a:t>7 February 2022</a:t>
             </a:r>
           </a:p>
         </p:txBody>
@@ -7064,13 +7064,13 @@
           </a:bodyPr>
           <a:lstStyle/>
           <a:p>
-            <a:pPr marL="184985" indent="-184985" defTabSz="562355">
+            <a:pPr marL="226915" indent="-226915" defTabSz="689823">
               <a:lnSpc>
                 <a:spcPct val="115000"/>
               </a:lnSpc>
               <a:buSzPct val="100000"/>
               <a:buAutoNum type="alphaUcPeriod" startAt="1"/>
-              <a:defRPr b="1" sz="1050">
+              <a:defRPr b="1" sz="1288">
                 <a:solidFill>
                   <a:srgbClr val="000000"/>
                 </a:solidFill>
@@ -7081,24 +7081,17 @@
               </a:defRPr>
             </a:pPr>
             <a:r>
-              <a:t>Find your </a:t>
-            </a:r>
-            <a:r>
-              <a:rPr i="1" u="sng"/>
-              <a:t>assigned</a:t>
-            </a:r>
-            <a:r>
-              <a:t> seat (ask Dr. O’Brien)</a:t>
-            </a:r>
-          </a:p>
-          <a:p>
-            <a:pPr marL="184985" indent="-184985" defTabSz="562355">
+              <a:t>Find your seat  </a:t>
+            </a:r>
+          </a:p>
+          <a:p>
+            <a:pPr marL="226915" indent="-226915" defTabSz="689823">
               <a:lnSpc>
                 <a:spcPct val="115000"/>
               </a:lnSpc>
               <a:buSzPct val="100000"/>
               <a:buAutoNum type="alphaUcPeriod" startAt="1"/>
-              <a:defRPr b="1" sz="1050">
+              <a:defRPr b="1" sz="1288">
                 <a:solidFill>
                   <a:srgbClr val="000000"/>
                 </a:solidFill>
@@ -7109,38 +7102,17 @@
               </a:defRPr>
             </a:pPr>
             <a:r>
-              <a:t>Read through the Marking Period requirements below.</a:t>
-            </a:r>
-          </a:p>
-          <a:p>
-            <a:pPr marL="184985" indent="-184985" defTabSz="562355">
+              <a:t>Read through the Weekly goals to the right.</a:t>
+            </a:r>
+          </a:p>
+          <a:p>
+            <a:pPr marL="226915" indent="-226915" defTabSz="689823">
               <a:lnSpc>
                 <a:spcPct val="115000"/>
               </a:lnSpc>
               <a:buSzPct val="100000"/>
               <a:buAutoNum type="alphaUcPeriod" startAt="1"/>
-              <a:defRPr b="1" sz="1050">
-                <a:solidFill>
-                  <a:srgbClr val="000000"/>
-                </a:solidFill>
-                <a:latin typeface="Lato"/>
-                <a:ea typeface="Lato"/>
-                <a:cs typeface="Lato"/>
-                <a:sym typeface="Lato"/>
-              </a:defRPr>
-            </a:pPr>
-            <a:r>
-              <a:t>Make sure your Python glossary is updated.</a:t>
-            </a:r>
-          </a:p>
-          <a:p>
-            <a:pPr marL="184985" indent="-184985" defTabSz="562355">
-              <a:lnSpc>
-                <a:spcPct val="115000"/>
-              </a:lnSpc>
-              <a:buSzPct val="100000"/>
-              <a:buAutoNum type="alphaUcPeriod" startAt="1"/>
-              <a:defRPr b="1" sz="1050">
+              <a:defRPr b="1" sz="1288">
                 <a:solidFill>
                   <a:srgbClr val="000000"/>
                 </a:solidFill>
@@ -7296,7 +7268,7 @@
             </a:r>
             <a:r>
               <a:rPr b="1"/>
-              <a:t>unit 5</a:t>
+              <a:t>unit 6</a:t>
             </a:r>
             <a:endParaRPr b="1"/>
           </a:p>
@@ -7311,7 +7283,7 @@
               </a:defRPr>
             </a:pPr>
             <a:r>
-              <a:t>Work on unit 6.</a:t>
+              <a:t>Work on unit 7</a:t>
             </a:r>
           </a:p>
         </p:txBody>
@@ -7473,54 +7445,6 @@
                                           <p:spTgt spid="217">
                                             <p:txEl>
                                               <p:pRg st="2" end="2"/>
-                                            </p:txEl>
-                                          </p:spTgt>
-                                        </p:tgtEl>
-                                        <p:attrNameLst>
-                                          <p:attrName>style.visibility</p:attrName>
-                                        </p:attrNameLst>
-                                      </p:cBhvr>
-                                      <p:to>
-                                        <p:strVal val="visible"/>
-                                      </p:to>
-                                    </p:set>
-                                  </p:childTnLst>
-                                </p:cTn>
-                              </p:par>
-                            </p:childTnLst>
-                          </p:cTn>
-                        </p:par>
-                      </p:childTnLst>
-                    </p:cTn>
-                  </p:par>
-                  <p:par>
-                    <p:cTn id="16" fill="hold">
-                      <p:stCondLst>
-                        <p:cond delay="indefinite"/>
-                      </p:stCondLst>
-                      <p:childTnLst>
-                        <p:par>
-                          <p:cTn id="17" fill="hold">
-                            <p:stCondLst>
-                              <p:cond delay="0"/>
-                            </p:stCondLst>
-                            <p:childTnLst>
-                              <p:par>
-                                <p:cTn id="18" presetClass="entr" nodeType="clickEffect" presetSubtype="0" presetID="1" grpId="1" fill="hold">
-                                  <p:stCondLst>
-                                    <p:cond delay="0"/>
-                                  </p:stCondLst>
-                                  <p:iterate type="el" backwards="0">
-                                    <p:tmAbs val="0"/>
-                                  </p:iterate>
-                                  <p:childTnLst>
-                                    <p:set>
-                                      <p:cBhvr>
-                                        <p:cTn id="19" fill="hold"/>
-                                        <p:tgtEl>
-                                          <p:spTgt spid="217">
-                                            <p:txEl>
-                                              <p:pRg st="3" end="3"/>
                                             </p:txEl>
                                           </p:spTgt>
                                         </p:tgtEl>

</xml_diff>